<commit_message>
Cambios generales & GET/POST usuario
</commit_message>
<xml_diff>
--- a/Documentacion/CURL.pptx
+++ b/Documentacion/CURL.pptx
@@ -105,6 +105,11 @@
       </a:defRPr>
     </a:lvl9pPr>
   </p:defaultTextStyle>
+  <p:extLst>
+    <p:ext uri="{EFAFB233-063F-42B5-8137-9DF3F51BA10A}">
+      <p15:sldGuideLst xmlns:p15="http://schemas.microsoft.com/office/powerpoint/2012/main"/>
+    </p:ext>
+  </p:extLst>
 </p:presentation>
 </file>
 
@@ -3030,13 +3035,24 @@
               <a:rPr lang="es-ES" dirty="0" smtClean="0">
                 <a:hlinkClick r:id="rId2"/>
               </a:rPr>
-              <a:t>http://localhost:8080/ChipdrunksAPI/api/</a:t>
+              <a:t>http://</a:t>
+            </a:r>
+            <a:r>
+              <a:rPr lang="es-ES" u="sng" dirty="0" smtClean="0">
+                <a:hlinkClick r:id="rId2"/>
+              </a:rPr>
+              <a:t>localhost:8080/Chipdrunks/api</a:t>
+            </a:r>
+            <a:r>
+              <a:rPr lang="es-ES" dirty="0" smtClean="0">
+                <a:hlinkClick r:id="rId2"/>
+              </a:rPr>
+              <a:t>/</a:t>
             </a:r>
             <a:r>
               <a:rPr lang="es-ES" dirty="0" smtClean="0"/>
               <a:t> </a:t>
             </a:r>
-            <a:endParaRPr lang="es-ES" dirty="0" smtClean="0"/>
           </a:p>
           <a:p>
             <a:pPr marL="285750" indent="-285750">
@@ -3068,8 +3084,12 @@
               <a:buChar char="•"/>
             </a:pPr>
             <a:r>
+              <a:rPr lang="es-ES" dirty="0" err="1"/>
+              <a:t>c</a:t>
+            </a:r>
+            <a:r>
               <a:rPr lang="es-ES" dirty="0" err="1" smtClean="0"/>
-              <a:t>Curl</a:t>
+              <a:t>url</a:t>
             </a:r>
             <a:r>
               <a:rPr lang="es-ES" dirty="0" smtClean="0"/>
@@ -3079,7 +3099,17 @@
               <a:rPr lang="es-ES" dirty="0" smtClean="0">
                 <a:hlinkClick r:id="rId3"/>
               </a:rPr>
-              <a:t>http://localhost:8080/ChipdrunksAPI/api/usuario</a:t>
+              <a:t>http://</a:t>
+            </a:r>
+            <a:r>
+              <a:rPr lang="es-ES" dirty="0" smtClean="0">
+                <a:hlinkClick r:id="rId3"/>
+              </a:rPr>
+              <a:t>localhost:8080/Chipdrunks/api/usuario</a:t>
+            </a:r>
+            <a:r>
+              <a:rPr lang="es-ES" dirty="0" smtClean="0"/>
+              <a:t>s</a:t>
             </a:r>
             <a:endParaRPr lang="es-ES" dirty="0" smtClean="0"/>
           </a:p>
@@ -3096,28 +3126,44 @@
               <a:buChar char="•"/>
             </a:pPr>
             <a:r>
+              <a:rPr lang="es-ES" dirty="0" err="1"/>
+              <a:t>c</a:t>
+            </a:r>
+            <a:r>
               <a:rPr lang="es-ES" dirty="0" err="1" smtClean="0"/>
-              <a:t>Curl</a:t>
+              <a:t>url</a:t>
             </a:r>
             <a:r>
               <a:rPr lang="es-ES" dirty="0" smtClean="0"/>
-              <a:t> – X POST –H {</a:t>
-            </a:r>
-            <a:r>
-              <a:rPr lang="es-ES" dirty="0" err="1" smtClean="0"/>
+              <a:t> –X </a:t>
+            </a:r>
+            <a:r>
+              <a:rPr lang="es-ES" dirty="0" smtClean="0"/>
+              <a:t>POST –H </a:t>
+            </a:r>
+            <a:r>
+              <a:rPr lang="es-ES" dirty="0"/>
+              <a:t>"</a:t>
+            </a:r>
+            <a:r>
+              <a:rPr lang="es-ES" dirty="0" err="1"/>
               <a:t>Content-Type:application</a:t>
             </a:r>
             <a:r>
+              <a:rPr lang="es-ES" dirty="0"/>
+              <a:t>/</a:t>
+            </a:r>
+            <a:r>
+              <a:rPr lang="es-ES" dirty="0" err="1"/>
+              <a:t>json</a:t>
+            </a:r>
+            <a:r>
               <a:rPr lang="es-ES" dirty="0" smtClean="0"/>
-              <a:t>/</a:t>
-            </a:r>
-            <a:r>
-              <a:rPr lang="es-ES" dirty="0" err="1" smtClean="0"/>
-              <a:t>json</a:t>
+              <a:t>"  </a:t>
             </a:r>
             <a:r>
               <a:rPr lang="es-ES" dirty="0" smtClean="0"/>
-              <a:t>}  –d "{\"</a:t>
+              <a:t>–d "{\"</a:t>
             </a:r>
             <a:r>
               <a:rPr lang="es-ES" dirty="0" err="1" smtClean="0"/>
@@ -3125,27 +3171,7 @@
             </a:r>
             <a:r>
               <a:rPr lang="es-ES" dirty="0" smtClean="0"/>
-              <a:t>\":0, \</a:t>
-            </a:r>
-            <a:r>
-              <a:rPr lang="es-ES" dirty="0" smtClean="0"/>
-              <a:t>"</a:t>
-            </a:r>
-            <a:r>
-              <a:rPr lang="es-ES" dirty="0" smtClean="0"/>
-              <a:t>nombre\":\</a:t>
-            </a:r>
-            <a:r>
-              <a:rPr lang="es-ES" dirty="0" smtClean="0"/>
-              <a:t>"</a:t>
-            </a:r>
-            <a:r>
-              <a:rPr lang="es-ES" dirty="0" smtClean="0"/>
-              <a:t>Charlie\",</a:t>
-            </a:r>
-            <a:r>
-              <a:rPr lang="es-ES" dirty="0" smtClean="0"/>
-              <a:t> \</a:t>
+              <a:t>\":0, \"nombre\":\"Charlie\", \</a:t>
             </a:r>
             <a:r>
               <a:rPr lang="es-ES" dirty="0"/>
@@ -3153,15 +3179,15 @@
             </a:r>
             <a:r>
               <a:rPr lang="es-ES" dirty="0" err="1" smtClean="0"/>
-              <a:t>cp</a:t>
+              <a:t>codigopostal</a:t>
             </a:r>
             <a:r>
               <a:rPr lang="es-ES" dirty="0" smtClean="0"/>
-              <a:t>\":28907,</a:t>
+              <a:t>\":</a:t>
             </a:r>
             <a:r>
               <a:rPr lang="es-ES" dirty="0" smtClean="0"/>
-              <a:t> \</a:t>
+              <a:t>28907, \</a:t>
             </a:r>
             <a:r>
               <a:rPr lang="es-ES" dirty="0"/>
@@ -3169,27 +3195,7 @@
             </a:r>
             <a:r>
               <a:rPr lang="es-ES" dirty="0" smtClean="0"/>
-              <a:t>email\":</a:t>
-            </a:r>
-            <a:r>
-              <a:rPr lang="es-ES" dirty="0" smtClean="0"/>
-              <a:t>\"</a:t>
-            </a:r>
-            <a:r>
-              <a:rPr lang="es-ES" dirty="0" smtClean="0"/>
-              <a:t>Charlie@Gmail.com</a:t>
-            </a:r>
-            <a:r>
-              <a:rPr lang="es-ES" dirty="0" smtClean="0"/>
-              <a:t>\"</a:t>
-            </a:r>
-            <a:r>
-              <a:rPr lang="es-ES" dirty="0" smtClean="0"/>
-              <a:t>,</a:t>
-            </a:r>
-            <a:r>
-              <a:rPr lang="es-ES" dirty="0" smtClean="0"/>
-              <a:t> \"</a:t>
+              <a:t>email\":\"Charlie@Gmail.com\", \"</a:t>
             </a:r>
             <a:r>
               <a:rPr lang="es-ES" dirty="0" err="1" smtClean="0"/>
@@ -3205,19 +3211,11 @@
             </a:r>
             <a:r>
               <a:rPr lang="es-ES" dirty="0" err="1" smtClean="0"/>
-              <a:t>c</a:t>
-            </a:r>
-            <a:r>
-              <a:rPr lang="es-ES" dirty="0" err="1" smtClean="0"/>
-              <a:t>harlie</a:t>
+              <a:t>charlie</a:t>
             </a:r>
             <a:r>
               <a:rPr lang="es-ES" dirty="0" smtClean="0"/>
-              <a:t>\", \</a:t>
-            </a:r>
-            <a:r>
-              <a:rPr lang="es-ES" dirty="0" smtClean="0"/>
-              <a:t>"</a:t>
+              <a:t>\", \"</a:t>
             </a:r>
             <a:r>
               <a:rPr lang="es-ES" dirty="0" err="1" smtClean="0"/>
@@ -3225,21 +3223,27 @@
             </a:r>
             <a:r>
               <a:rPr lang="es-ES" dirty="0" smtClean="0"/>
-              <a:t>\":63</a:t>
+              <a:t>\":63}" </a:t>
+            </a:r>
+            <a:r>
+              <a:rPr lang="es-ES" dirty="0" smtClean="0">
+                <a:hlinkClick r:id="rId3"/>
+              </a:rPr>
+              <a:t>http://</a:t>
+            </a:r>
+            <a:r>
+              <a:rPr lang="es-ES" dirty="0" smtClean="0">
+                <a:hlinkClick r:id="rId3"/>
+              </a:rPr>
+              <a:t>localhost:8080/Chipdrunks/api/usuario</a:t>
             </a:r>
             <a:r>
               <a:rPr lang="es-ES" dirty="0" smtClean="0"/>
-              <a:t>}" </a:t>
-            </a:r>
-            <a:r>
-              <a:rPr lang="es-ES" dirty="0" smtClean="0">
-                <a:hlinkClick r:id="rId4"/>
-              </a:rPr>
-              <a:t>http://localhost:8080/AppPedidos/api/usuario</a:t>
+              <a:t>s </a:t>
             </a:r>
             <a:r>
               <a:rPr lang="es-ES" dirty="0" smtClean="0"/>
-              <a:t> -v</a:t>
+              <a:t>-v</a:t>
             </a:r>
           </a:p>
           <a:p>
@@ -3265,8 +3269,12 @@
               <a:buChar char="•"/>
             </a:pPr>
             <a:r>
+              <a:rPr lang="es-ES" dirty="0" err="1"/>
+              <a:t>c</a:t>
+            </a:r>
+            <a:r>
               <a:rPr lang="es-ES" dirty="0" err="1" smtClean="0"/>
-              <a:t>Curl</a:t>
+              <a:t>url</a:t>
             </a:r>
             <a:r>
               <a:rPr lang="es-ES" dirty="0" smtClean="0"/>
@@ -3274,14 +3282,21 @@
             </a:r>
             <a:r>
               <a:rPr lang="es-ES" dirty="0" smtClean="0">
-                <a:hlinkClick r:id="rId5"/>
+                <a:hlinkClick r:id="rId4"/>
               </a:rPr>
-              <a:t>http://localhost:8080/ChipdrunksAPI/api/clan</a:t>
+              <a:t>http://</a:t>
+            </a:r>
+            <a:r>
+              <a:rPr lang="es-ES" u="sng" dirty="0" smtClean="0">
+                <a:hlinkClick r:id="rId4"/>
+              </a:rPr>
+              <a:t>localhost:8080/Chipdrunks/api/clan</a:t>
             </a:r>
             <a:r>
               <a:rPr lang="es-ES" dirty="0" smtClean="0"/>
               <a:t> </a:t>
             </a:r>
+            <a:endParaRPr lang="es-ES" dirty="0" smtClean="0"/>
           </a:p>
           <a:p>
             <a:pPr marL="285750" indent="-285750">
@@ -3296,28 +3311,48 @@
               <a:buChar char="•"/>
             </a:pPr>
             <a:r>
+              <a:rPr lang="es-ES" dirty="0" err="1"/>
+              <a:t>c</a:t>
+            </a:r>
+            <a:r>
               <a:rPr lang="es-ES" dirty="0" err="1" smtClean="0"/>
-              <a:t>Curl</a:t>
+              <a:t>url</a:t>
             </a:r>
             <a:r>
               <a:rPr lang="es-ES" dirty="0" smtClean="0"/>
-              <a:t> – X POST –H {</a:t>
-            </a:r>
-            <a:r>
-              <a:rPr lang="es-ES" dirty="0" err="1" smtClean="0"/>
+              <a:t> –X </a:t>
+            </a:r>
+            <a:r>
+              <a:rPr lang="es-ES" dirty="0" smtClean="0"/>
+              <a:t>POST </a:t>
+            </a:r>
+            <a:r>
+              <a:rPr lang="es-ES" dirty="0"/>
+              <a:t> -H "</a:t>
+            </a:r>
+            <a:r>
+              <a:rPr lang="es-ES" dirty="0" err="1"/>
               <a:t>Content-Type:application</a:t>
             </a:r>
             <a:r>
+              <a:rPr lang="es-ES" dirty="0"/>
+              <a:t>/</a:t>
+            </a:r>
+            <a:r>
+              <a:rPr lang="es-ES" dirty="0" err="1"/>
+              <a:t>json</a:t>
+            </a:r>
+            <a:r>
+              <a:rPr lang="es-ES" dirty="0"/>
+              <a:t>" </a:t>
+            </a:r>
+            <a:r>
               <a:rPr lang="es-ES" dirty="0" smtClean="0"/>
-              <a:t>/</a:t>
-            </a:r>
-            <a:r>
-              <a:rPr lang="es-ES" dirty="0" err="1" smtClean="0"/>
-              <a:t>json</a:t>
+              <a:t> –</a:t>
             </a:r>
             <a:r>
               <a:rPr lang="es-ES" dirty="0" smtClean="0"/>
-              <a:t>}  –d "{\“</a:t>
+              <a:t>d "{\“</a:t>
             </a:r>
             <a:r>
               <a:rPr lang="es-ES" dirty="0"/>
@@ -3344,16 +3379,29 @@
               <a:t>\":6}" </a:t>
             </a:r>
             <a:r>
+              <a:rPr lang="es-ES" dirty="0">
+                <a:hlinkClick r:id="rId3"/>
+              </a:rPr>
+              <a:t>http://</a:t>
+            </a:r>
+            <a:r>
               <a:rPr lang="es-ES" dirty="0" smtClean="0">
-                <a:hlinkClick r:id="rId6"/>
+                <a:hlinkClick r:id="rId3"/>
               </a:rPr>
-              <a:t>http://localhost:8080/AppPedidos/api/clan</a:t>
+              <a:t>localhost:8080/Chipdrunks/api/</a:t>
             </a:r>
             <a:r>
               <a:rPr lang="es-ES" dirty="0" smtClean="0"/>
-              <a:t>  -v</a:t>
-            </a:r>
-            <a:endParaRPr lang="es-ES" dirty="0" smtClean="0"/>
+              <a:t>clanes </a:t>
+            </a:r>
+            <a:r>
+              <a:rPr lang="es-ES" dirty="0"/>
+              <a:t>-</a:t>
+            </a:r>
+            <a:r>
+              <a:rPr lang="es-ES" dirty="0" smtClean="0"/>
+              <a:t>v</a:t>
+            </a:r>
           </a:p>
           <a:p>
             <a:pPr marL="742950" lvl="1" indent="-285750">
@@ -3410,7 +3458,7 @@
         <p:spPr>
           <a:xfrm>
             <a:off x="450760" y="669701"/>
-            <a:ext cx="11230377" cy="4801314"/>
+            <a:ext cx="11230377" cy="1754326"/>
           </a:xfrm>
           <a:prstGeom prst="rect">
             <a:avLst/>
@@ -3446,7 +3494,7 @@
             </a:pPr>
             <a:r>
               <a:rPr lang="es-ES" dirty="0" err="1" smtClean="0"/>
-              <a:t>Curl</a:t>
+              <a:t>curl</a:t>
             </a:r>
             <a:r>
               <a:rPr lang="es-ES" dirty="0" smtClean="0"/>
@@ -3456,12 +3504,19 @@
               <a:rPr lang="es-ES" dirty="0" smtClean="0">
                 <a:hlinkClick r:id="rId2"/>
               </a:rPr>
-              <a:t>http://localhost:8080/ChipdrunksAPI/api/bar</a:t>
+              <a:t>http://</a:t>
+            </a:r>
+            <a:r>
+              <a:rPr lang="es-ES" dirty="0" smtClean="0">
+                <a:hlinkClick r:id="rId2"/>
+              </a:rPr>
+              <a:t>localhost:8080/Chipdrunks/api/bar</a:t>
             </a:r>
             <a:r>
               <a:rPr lang="es-ES" dirty="0" smtClean="0"/>
-              <a:t> </a:t>
-            </a:r>
+              <a:t>es</a:t>
+            </a:r>
+            <a:endParaRPr lang="es-ES" dirty="0" smtClean="0"/>
           </a:p>
           <a:p>
             <a:pPr marL="285750" indent="-285750">
@@ -3471,261 +3526,48 @@
             <a:endParaRPr lang="es-ES" dirty="0" smtClean="0"/>
           </a:p>
           <a:p>
+            <a:pPr marL="285750" indent="-285750">
+              <a:buFont typeface="Arial" panose="020B0604020202020204" pitchFamily="34" charset="0"/>
+              <a:buChar char="•"/>
+            </a:pPr>
+            <a:r>
+              <a:rPr lang="es-ES" dirty="0" smtClean="0"/>
+              <a:t>PETICION CERVEZAS</a:t>
+            </a:r>
+          </a:p>
+          <a:p>
             <a:pPr marL="742950" lvl="1" indent="-285750">
               <a:buFont typeface="Arial" panose="020B0604020202020204" pitchFamily="34" charset="0"/>
               <a:buChar char="•"/>
             </a:pPr>
             <a:r>
-              <a:rPr lang="es-ES" dirty="0" err="1" smtClean="0"/>
-              <a:t>Curl</a:t>
+              <a:rPr lang="es-ES" u="sng" dirty="0" err="1"/>
+              <a:t>c</a:t>
+            </a:r>
+            <a:r>
+              <a:rPr lang="es-ES" u="sng" dirty="0" err="1" smtClean="0"/>
+              <a:t>url</a:t>
             </a:r>
             <a:r>
               <a:rPr lang="es-ES" dirty="0" smtClean="0"/>
-              <a:t> – X POST –H {</a:t>
-            </a:r>
-            <a:r>
-              <a:rPr lang="es-ES" dirty="0" err="1" smtClean="0"/>
-              <a:t>Content-Type:application</a:t>
-            </a:r>
-            <a:r>
-              <a:rPr lang="es-ES" dirty="0" smtClean="0"/>
-              <a:t>/</a:t>
-            </a:r>
-            <a:r>
-              <a:rPr lang="es-ES" dirty="0" err="1" smtClean="0"/>
-              <a:t>json</a:t>
-            </a:r>
-            <a:r>
-              <a:rPr lang="es-ES" dirty="0" smtClean="0"/>
-              <a:t>}  –d "{\“</a:t>
-            </a:r>
-            <a:r>
-              <a:rPr lang="es-ES" dirty="0" err="1" smtClean="0"/>
-              <a:t>bid</a:t>
-            </a:r>
-            <a:r>
-              <a:rPr lang="es-ES" dirty="0" smtClean="0"/>
-              <a:t>\":0, \"nombre\":\"</a:t>
-            </a:r>
-            <a:r>
-              <a:rPr lang="es-ES" dirty="0"/>
-              <a:t> Bar el </a:t>
-            </a:r>
-            <a:r>
-              <a:rPr lang="es-ES" dirty="0" err="1"/>
-              <a:t>Alamo</a:t>
-            </a:r>
-            <a:r>
-              <a:rPr lang="es-ES" dirty="0"/>
               <a:t> </a:t>
-            </a:r>
-            <a:r>
-              <a:rPr lang="es-ES" dirty="0" smtClean="0"/>
-              <a:t>\", \“dirección\":\"</a:t>
-            </a:r>
-            <a:r>
-              <a:rPr lang="es-ES" dirty="0"/>
-              <a:t> Calle Madrid 2 </a:t>
-            </a:r>
-            <a:r>
-              <a:rPr lang="es-ES" dirty="0" smtClean="0"/>
-              <a:t>\“, \“</a:t>
-            </a:r>
-            <a:r>
-              <a:rPr lang="es-ES" dirty="0" err="1" smtClean="0"/>
-              <a:t>telefono</a:t>
-            </a:r>
-            <a:r>
-              <a:rPr lang="es-ES" dirty="0" smtClean="0"/>
-              <a:t>\":</a:t>
-            </a:r>
-            <a:r>
-              <a:rPr lang="es-ES" dirty="0"/>
-              <a:t> 916564876</a:t>
-            </a:r>
-            <a:r>
-              <a:rPr lang="es-ES" dirty="0" smtClean="0"/>
-              <a:t>, \" latitud \":</a:t>
-            </a:r>
-            <a:r>
-              <a:rPr lang="es-ES" dirty="0"/>
-              <a:t> 40.4619445</a:t>
-            </a:r>
-            <a:r>
-              <a:rPr lang="es-ES" dirty="0" smtClean="0"/>
-              <a:t>, \" longitud \":</a:t>
-            </a:r>
-            <a:r>
-              <a:rPr lang="es-ES" dirty="0"/>
-              <a:t> -3.6741318</a:t>
-            </a:r>
-            <a:r>
-              <a:rPr lang="es-ES" dirty="0" smtClean="0"/>
-              <a:t>, \“</a:t>
-            </a:r>
-            <a:r>
-              <a:rPr lang="es-ES" dirty="0" err="1" smtClean="0"/>
-              <a:t>descripcion</a:t>
-            </a:r>
-            <a:r>
-              <a:rPr lang="es-ES" dirty="0" smtClean="0"/>
-              <a:t>\":\"</a:t>
-            </a:r>
-            <a:r>
-              <a:rPr lang="es-ES" dirty="0"/>
-              <a:t> Chupitos Gratis de 00:00 a 00:30 los Martes </a:t>
-            </a:r>
-            <a:r>
-              <a:rPr lang="es-ES" dirty="0" smtClean="0"/>
-              <a:t>\"}" </a:t>
             </a:r>
             <a:r>
               <a:rPr lang="es-ES" dirty="0" smtClean="0">
                 <a:hlinkClick r:id="rId3"/>
               </a:rPr>
-              <a:t>http://localhost:8080/AppPedidos/api/bar</a:t>
-            </a:r>
-            <a:r>
-              <a:rPr lang="es-ES" dirty="0" smtClean="0"/>
-              <a:t>  -v</a:t>
-            </a:r>
-          </a:p>
-          <a:p>
-            <a:pPr marL="285750" indent="-285750">
-              <a:buFont typeface="Arial" panose="020B0604020202020204" pitchFamily="34" charset="0"/>
-              <a:buChar char="•"/>
-            </a:pPr>
-            <a:endParaRPr lang="es-ES" dirty="0" smtClean="0"/>
-          </a:p>
-          <a:p>
-            <a:pPr marL="285750" indent="-285750">
-              <a:buFont typeface="Arial" panose="020B0604020202020204" pitchFamily="34" charset="0"/>
-              <a:buChar char="•"/>
-            </a:pPr>
-            <a:endParaRPr lang="es-ES" dirty="0" smtClean="0"/>
-          </a:p>
-          <a:p>
-            <a:pPr marL="285750" indent="-285750">
-              <a:buFont typeface="Arial" panose="020B0604020202020204" pitchFamily="34" charset="0"/>
-              <a:buChar char="•"/>
-            </a:pPr>
-            <a:r>
-              <a:rPr lang="es-ES" dirty="0" smtClean="0"/>
-              <a:t>PETICION CERVEZAS</a:t>
-            </a:r>
-          </a:p>
-          <a:p>
-            <a:pPr marL="742950" lvl="1" indent="-285750">
-              <a:buFont typeface="Arial" panose="020B0604020202020204" pitchFamily="34" charset="0"/>
-              <a:buChar char="•"/>
-            </a:pPr>
-            <a:r>
-              <a:rPr lang="es-ES" dirty="0" err="1" smtClean="0"/>
-              <a:t>Curl</a:t>
-            </a:r>
-            <a:r>
-              <a:rPr lang="es-ES" dirty="0" smtClean="0"/>
-              <a:t> </a:t>
+              <a:t>http://</a:t>
             </a:r>
             <a:r>
               <a:rPr lang="es-ES" dirty="0" smtClean="0">
-                <a:hlinkClick r:id="rId4"/>
+                <a:hlinkClick r:id="rId3"/>
               </a:rPr>
-              <a:t>http://localhost:8080/ChipdrunksAPI/api/cerveza</a:t>
-            </a:r>
-            <a:r>
-              <a:rPr lang="es-ES" dirty="0" smtClean="0"/>
-              <a:t>  </a:t>
-            </a:r>
-          </a:p>
-          <a:p>
-            <a:pPr marL="285750" indent="-285750">
-              <a:buFont typeface="Arial" panose="020B0604020202020204" pitchFamily="34" charset="0"/>
-              <a:buChar char="•"/>
-            </a:pPr>
-            <a:endParaRPr lang="es-ES" dirty="0" smtClean="0"/>
-          </a:p>
-          <a:p>
-            <a:pPr marL="742950" lvl="1" indent="-285750">
-              <a:buFont typeface="Arial" panose="020B0604020202020204" pitchFamily="34" charset="0"/>
-              <a:buChar char="•"/>
-            </a:pPr>
-            <a:r>
-              <a:rPr lang="es-ES" dirty="0" err="1" smtClean="0"/>
-              <a:t>Curl</a:t>
-            </a:r>
-            <a:r>
-              <a:rPr lang="es-ES" dirty="0" smtClean="0"/>
-              <a:t> – X POST –H {</a:t>
-            </a:r>
-            <a:r>
-              <a:rPr lang="es-ES" dirty="0" err="1" smtClean="0"/>
-              <a:t>Content-Type:application</a:t>
-            </a:r>
-            <a:r>
-              <a:rPr lang="es-ES" dirty="0" smtClean="0"/>
-              <a:t>/</a:t>
-            </a:r>
-            <a:r>
-              <a:rPr lang="es-ES" dirty="0" err="1" smtClean="0"/>
-              <a:t>json</a:t>
-            </a:r>
-            <a:r>
-              <a:rPr lang="es-ES" dirty="0" smtClean="0"/>
-              <a:t>}  –d "{\“</a:t>
-            </a:r>
-            <a:r>
-              <a:rPr lang="es-ES" dirty="0" err="1" smtClean="0"/>
-              <a:t>zid</a:t>
-            </a:r>
-            <a:r>
-              <a:rPr lang="es-ES" dirty="0" smtClean="0"/>
-              <a:t>\":0, \"nombre\":\“</a:t>
-            </a:r>
-            <a:r>
-              <a:rPr lang="es-ES" dirty="0" err="1" smtClean="0"/>
-              <a:t>Leffe</a:t>
-            </a:r>
-            <a:r>
-              <a:rPr lang="es-ES" dirty="0" smtClean="0"/>
-              <a:t>\", \“</a:t>
-            </a:r>
-            <a:r>
-              <a:rPr lang="es-ES" dirty="0" err="1" smtClean="0"/>
-              <a:t>porcentaje</a:t>
-            </a:r>
-            <a:r>
-              <a:rPr lang="es-ES" dirty="0" err="1" smtClean="0"/>
-              <a:t>_alcohol</a:t>
-            </a:r>
-            <a:r>
-              <a:rPr lang="es-ES" dirty="0" smtClean="0"/>
-              <a:t>\":7.5, \“</a:t>
-            </a:r>
-            <a:r>
-              <a:rPr lang="es-ES" dirty="0" err="1" smtClean="0"/>
-              <a:t>descripcion</a:t>
-            </a:r>
-            <a:r>
-              <a:rPr lang="es-ES" dirty="0" smtClean="0"/>
-              <a:t>\":\" Cerveza belga\"}" </a:t>
-            </a:r>
-            <a:r>
-              <a:rPr lang="es-ES" dirty="0" smtClean="0">
-                <a:hlinkClick r:id="rId5"/>
-              </a:rPr>
-              <a:t>http://localhost:8080/AppPedidos/api/cerveza</a:t>
-            </a:r>
-            <a:r>
-              <a:rPr lang="es-ES" dirty="0" smtClean="0"/>
-              <a:t> -v</a:t>
-            </a:r>
-          </a:p>
-          <a:p>
-            <a:pPr marL="742950" lvl="1" indent="-285750">
-              <a:buFont typeface="Arial" panose="020B0604020202020204" pitchFamily="34" charset="0"/>
-              <a:buChar char="•"/>
-            </a:pPr>
+              <a:t>localhost:8080/Chipdrunks/api/cerveza</a:t>
+            </a:r>
+            <a:r>
+              <a:rPr lang="es-ES" dirty="0"/>
+              <a:t>s</a:t>
+            </a:r>
             <a:endParaRPr lang="es-ES" dirty="0" smtClean="0"/>
           </a:p>
         </p:txBody>

</xml_diff>